<commit_message>
add index.css to separate style from index.html
</commit_message>
<xml_diff>
--- a/disp.pptx
+++ b/disp.pptx
@@ -6,6 +6,7 @@
   </p:sldMasterIdLst>
   <p:sldIdLst>
     <p:sldId id="256" r:id="rId2"/>
+    <p:sldId id="257" r:id="rId3"/>
   </p:sldIdLst>
   <p:sldSz cx="9144000" cy="6858000" type="screen4x3"/>
   <p:notesSz cx="6858000" cy="9144000"/>
@@ -104,6 +105,11 @@
       </a:defRPr>
     </a:lvl9pPr>
   </p:defaultTextStyle>
+  <p:extLst>
+    <p:ext uri="{EFAFB233-063F-42B5-8137-9DF3F51BA10A}">
+      <p15:sldGuideLst xmlns:p15="http://schemas.microsoft.com/office/powerpoint/2012/main"/>
+    </p:ext>
+  </p:extLst>
 </p:presentation>
 </file>
 
@@ -238,7 +244,7 @@
           <a:p>
             <a:fld id="{548BD80E-D631-4C41-BB99-5499A647A513}" type="datetimeFigureOut">
               <a:rPr kumimoji="1" lang="ja-JP" altLang="en-US" smtClean="0"/>
-              <a:t>2016/10/11</a:t>
+              <a:t>2016/10/15</a:t>
             </a:fld>
             <a:endParaRPr kumimoji="1" lang="ja-JP" altLang="en-US"/>
           </a:p>
@@ -440,7 +446,7 @@
           <a:p>
             <a:fld id="{548BD80E-D631-4C41-BB99-5499A647A513}" type="datetimeFigureOut">
               <a:rPr kumimoji="1" lang="ja-JP" altLang="en-US" smtClean="0"/>
-              <a:t>2016/10/11</a:t>
+              <a:t>2016/10/15</a:t>
             </a:fld>
             <a:endParaRPr kumimoji="1" lang="ja-JP" altLang="en-US"/>
           </a:p>
@@ -652,7 +658,7 @@
           <a:p>
             <a:fld id="{548BD80E-D631-4C41-BB99-5499A647A513}" type="datetimeFigureOut">
               <a:rPr kumimoji="1" lang="ja-JP" altLang="en-US" smtClean="0"/>
-              <a:t>2016/10/11</a:t>
+              <a:t>2016/10/15</a:t>
             </a:fld>
             <a:endParaRPr kumimoji="1" lang="ja-JP" altLang="en-US"/>
           </a:p>
@@ -854,7 +860,7 @@
           <a:p>
             <a:fld id="{548BD80E-D631-4C41-BB99-5499A647A513}" type="datetimeFigureOut">
               <a:rPr kumimoji="1" lang="ja-JP" altLang="en-US" smtClean="0"/>
-              <a:t>2016/10/11</a:t>
+              <a:t>2016/10/15</a:t>
             </a:fld>
             <a:endParaRPr kumimoji="1" lang="ja-JP" altLang="en-US"/>
           </a:p>
@@ -1100,7 +1106,7 @@
           <a:p>
             <a:fld id="{548BD80E-D631-4C41-BB99-5499A647A513}" type="datetimeFigureOut">
               <a:rPr kumimoji="1" lang="ja-JP" altLang="en-US" smtClean="0"/>
-              <a:t>2016/10/11</a:t>
+              <a:t>2016/10/15</a:t>
             </a:fld>
             <a:endParaRPr kumimoji="1" lang="ja-JP" altLang="en-US"/>
           </a:p>
@@ -1396,7 +1402,7 @@
           <a:p>
             <a:fld id="{548BD80E-D631-4C41-BB99-5499A647A513}" type="datetimeFigureOut">
               <a:rPr kumimoji="1" lang="ja-JP" altLang="en-US" smtClean="0"/>
-              <a:t>2016/10/11</a:t>
+              <a:t>2016/10/15</a:t>
             </a:fld>
             <a:endParaRPr kumimoji="1" lang="ja-JP" altLang="en-US"/>
           </a:p>
@@ -1827,7 +1833,7 @@
           <a:p>
             <a:fld id="{548BD80E-D631-4C41-BB99-5499A647A513}" type="datetimeFigureOut">
               <a:rPr kumimoji="1" lang="ja-JP" altLang="en-US" smtClean="0"/>
-              <a:t>2016/10/11</a:t>
+              <a:t>2016/10/15</a:t>
             </a:fld>
             <a:endParaRPr kumimoji="1" lang="ja-JP" altLang="en-US"/>
           </a:p>
@@ -1945,7 +1951,7 @@
           <a:p>
             <a:fld id="{548BD80E-D631-4C41-BB99-5499A647A513}" type="datetimeFigureOut">
               <a:rPr kumimoji="1" lang="ja-JP" altLang="en-US" smtClean="0"/>
-              <a:t>2016/10/11</a:t>
+              <a:t>2016/10/15</a:t>
             </a:fld>
             <a:endParaRPr kumimoji="1" lang="ja-JP" altLang="en-US"/>
           </a:p>
@@ -2040,7 +2046,7 @@
           <a:p>
             <a:fld id="{548BD80E-D631-4C41-BB99-5499A647A513}" type="datetimeFigureOut">
               <a:rPr kumimoji="1" lang="ja-JP" altLang="en-US" smtClean="0"/>
-              <a:t>2016/10/11</a:t>
+              <a:t>2016/10/15</a:t>
             </a:fld>
             <a:endParaRPr kumimoji="1" lang="ja-JP" altLang="en-US"/>
           </a:p>
@@ -2349,7 +2355,7 @@
           <a:p>
             <a:fld id="{548BD80E-D631-4C41-BB99-5499A647A513}" type="datetimeFigureOut">
               <a:rPr kumimoji="1" lang="ja-JP" altLang="en-US" smtClean="0"/>
-              <a:t>2016/10/11</a:t>
+              <a:t>2016/10/15</a:t>
             </a:fld>
             <a:endParaRPr kumimoji="1" lang="ja-JP" altLang="en-US"/>
           </a:p>
@@ -2602,7 +2608,7 @@
           <a:p>
             <a:fld id="{548BD80E-D631-4C41-BB99-5499A647A513}" type="datetimeFigureOut">
               <a:rPr kumimoji="1" lang="ja-JP" altLang="en-US" smtClean="0"/>
-              <a:t>2016/10/11</a:t>
+              <a:t>2016/10/15</a:t>
             </a:fld>
             <a:endParaRPr kumimoji="1" lang="ja-JP" altLang="en-US"/>
           </a:p>
@@ -2847,7 +2853,7 @@
           <a:p>
             <a:fld id="{548BD80E-D631-4C41-BB99-5499A647A513}" type="datetimeFigureOut">
               <a:rPr kumimoji="1" lang="ja-JP" altLang="en-US" smtClean="0"/>
-              <a:t>2016/10/11</a:t>
+              <a:t>2016/10/15</a:t>
             </a:fld>
             <a:endParaRPr kumimoji="1" lang="ja-JP" altLang="en-US"/>
           </a:p>
@@ -3309,7 +3315,7 @@
         <p:spPr>
           <a:xfrm>
             <a:off x="566057" y="896987"/>
-            <a:ext cx="1724292" cy="5708474"/>
+            <a:ext cx="1659084" cy="5708474"/>
           </a:xfrm>
           <a:prstGeom prst="rect">
             <a:avLst/>
@@ -3373,11 +3379,15 @@
             <a:pPr algn="ctr"/>
             <a:r>
               <a:rPr kumimoji="1" lang="en-US" altLang="ja-JP" sz="1200" dirty="0" smtClean="0"/>
-              <a:t>id=“</a:t>
+              <a:t>id</a:t>
+            </a:r>
+            <a:r>
+              <a:rPr kumimoji="1" lang="en-US" altLang="ja-JP" sz="1200" dirty="0" smtClean="0"/>
+              <a:t>=“</a:t>
             </a:r>
             <a:r>
               <a:rPr kumimoji="1" lang="en-US" altLang="ja-JP" sz="1200" dirty="0" err="1" smtClean="0"/>
-              <a:t>sidemenu</a:t>
+              <a:t>div_sidemenu</a:t>
             </a:r>
             <a:r>
               <a:rPr kumimoji="1" lang="en-US" altLang="ja-JP" sz="1200" dirty="0" smtClean="0"/>
@@ -3402,8 +3412,8 @@
         </p:nvSpPr>
         <p:spPr>
           <a:xfrm>
-            <a:off x="2290353" y="896986"/>
-            <a:ext cx="6156959" cy="557349"/>
+            <a:off x="2264224" y="896986"/>
+            <a:ext cx="6156960" cy="557349"/>
           </a:xfrm>
           <a:prstGeom prst="rect">
             <a:avLst/>
@@ -3439,7 +3449,7 @@
           <a:lstStyle/>
           <a:p>
             <a:pPr algn="ctr"/>
-            <a:endParaRPr kumimoji="1" lang="ja-JP" altLang="en-US"/>
+            <a:endParaRPr kumimoji="1" lang="ja-JP" altLang="en-US" dirty="0"/>
           </a:p>
         </p:txBody>
       </p:sp>
@@ -3451,8 +3461,8 @@
         </p:nvSpPr>
         <p:spPr>
           <a:xfrm>
-            <a:off x="3196090" y="1113865"/>
-            <a:ext cx="4410695" cy="276999"/>
+            <a:off x="3068780" y="1113865"/>
+            <a:ext cx="4665316" cy="276999"/>
           </a:xfrm>
           <a:prstGeom prst="rect">
             <a:avLst/>
@@ -3468,19 +3478,23 @@
             <a:pPr algn="ctr"/>
             <a:r>
               <a:rPr kumimoji="1" lang="en-US" altLang="ja-JP" sz="1200" dirty="0" smtClean="0"/>
-              <a:t>id=“</a:t>
+              <a:t>id</a:t>
+            </a:r>
+            <a:r>
+              <a:rPr kumimoji="1" lang="en-US" altLang="ja-JP" sz="1200" dirty="0" smtClean="0"/>
+              <a:t>=“</a:t>
             </a:r>
             <a:r>
               <a:rPr kumimoji="1" lang="en-US" altLang="ja-JP" sz="1200" dirty="0" err="1" smtClean="0"/>
-              <a:t>shared_selects</a:t>
+              <a:t>div_shared_selects</a:t>
             </a:r>
             <a:r>
               <a:rPr kumimoji="1" lang="en-US" altLang="ja-JP" sz="1200" dirty="0" smtClean="0"/>
-              <a:t>”, margin: 0px, </a:t>
+              <a:t>”, margin: 2px, </a:t>
             </a:r>
             <a:r>
               <a:rPr lang="en-US" altLang="ja-JP" sz="1200" dirty="0" smtClean="0"/>
-              <a:t>padding: 5px, </a:t>
+              <a:t>padding: 1px, </a:t>
             </a:r>
             <a:r>
               <a:rPr lang="en-US" altLang="ja-JP" sz="1200" dirty="0" err="1" smtClean="0"/>
@@ -3502,7 +3516,7 @@
         </p:nvSpPr>
         <p:spPr>
           <a:xfrm>
-            <a:off x="2290351" y="1532715"/>
+            <a:off x="2264224" y="1489170"/>
             <a:ext cx="3045878" cy="2490653"/>
           </a:xfrm>
           <a:prstGeom prst="rect">
@@ -3550,7 +3564,7 @@
         </p:nvSpPr>
         <p:spPr>
           <a:xfrm>
-            <a:off x="5401434" y="1532715"/>
+            <a:off x="5375307" y="1489170"/>
             <a:ext cx="3045878" cy="2490653"/>
           </a:xfrm>
           <a:prstGeom prst="rect">
@@ -3598,7 +3612,7 @@
         </p:nvSpPr>
         <p:spPr>
           <a:xfrm>
-            <a:off x="2290351" y="4114807"/>
+            <a:off x="2264224" y="4071262"/>
             <a:ext cx="3045878" cy="2490653"/>
           </a:xfrm>
           <a:prstGeom prst="rect">
@@ -3646,7 +3660,7 @@
         </p:nvSpPr>
         <p:spPr>
           <a:xfrm>
-            <a:off x="5401434" y="4114807"/>
+            <a:off x="5375307" y="4071262"/>
             <a:ext cx="3045878" cy="2490653"/>
           </a:xfrm>
           <a:prstGeom prst="rect">
@@ -3754,8 +3768,8 @@
         </p:nvSpPr>
         <p:spPr>
           <a:xfrm>
-            <a:off x="2927340" y="2547208"/>
-            <a:ext cx="1837106" cy="646331"/>
+            <a:off x="2885185" y="2503663"/>
+            <a:ext cx="1869166" cy="646331"/>
           </a:xfrm>
           <a:prstGeom prst="rect">
             <a:avLst/>
@@ -3771,14 +3785,22 @@
             <a:pPr algn="ctr"/>
             <a:r>
               <a:rPr kumimoji="1" lang="en-US" altLang="ja-JP" sz="1200" dirty="0" smtClean="0"/>
-              <a:t>id=“panel_div-0”</a:t>
+              <a:t>id</a:t>
+            </a:r>
+            <a:r>
+              <a:rPr kumimoji="1" lang="en-US" altLang="ja-JP" sz="1200" dirty="0" smtClean="0"/>
+              <a:t>=“div_panel-0</a:t>
+            </a:r>
+            <a:r>
+              <a:rPr kumimoji="1" lang="en-US" altLang="ja-JP" sz="1200" dirty="0" smtClean="0"/>
+              <a:t>”</a:t>
             </a:r>
           </a:p>
           <a:p>
             <a:pPr algn="ctr"/>
             <a:r>
               <a:rPr lang="en-US" altLang="ja-JP" sz="1200" dirty="0" smtClean="0"/>
-              <a:t>margin: 0px, padding: 0px,</a:t>
+              <a:t>margin: 2px,  padding: 1px,</a:t>
             </a:r>
           </a:p>
           <a:p>
@@ -3803,8 +3825,8 @@
         </p:nvSpPr>
         <p:spPr>
           <a:xfrm>
-            <a:off x="2290349" y="896987"/>
-            <a:ext cx="6156962" cy="5708474"/>
+            <a:off x="2225141" y="896987"/>
+            <a:ext cx="6222170" cy="5708474"/>
           </a:xfrm>
           <a:prstGeom prst="rect">
             <a:avLst/>
@@ -3868,7 +3890,19 @@
             <a:pPr algn="ctr"/>
             <a:r>
               <a:rPr kumimoji="1" lang="en-US" altLang="ja-JP" sz="1200" dirty="0" smtClean="0"/>
-              <a:t>id=“panel”</a:t>
+              <a:t>id</a:t>
+            </a:r>
+            <a:r>
+              <a:rPr kumimoji="1" lang="en-US" altLang="ja-JP" sz="1200" dirty="0" smtClean="0"/>
+              <a:t>=“</a:t>
+            </a:r>
+            <a:r>
+              <a:rPr kumimoji="1" lang="en-US" altLang="ja-JP" sz="1200" dirty="0" err="1" smtClean="0"/>
+              <a:t>div_panel</a:t>
+            </a:r>
+            <a:r>
+              <a:rPr kumimoji="1" lang="en-US" altLang="ja-JP" sz="1200" dirty="0" smtClean="0"/>
+              <a:t>”</a:t>
             </a:r>
           </a:p>
           <a:p>
@@ -3910,8 +3944,13 @@
             </a:r>
             <a:r>
               <a:rPr kumimoji="1" lang="en-US" altLang="ja-JP" sz="1200" dirty="0" smtClean="0"/>
-              <a:t>idth=100%-140px, height=20px</a:t>
-            </a:r>
+              <a:t>idth=100%-140px, </a:t>
+            </a:r>
+            <a:r>
+              <a:rPr kumimoji="1" lang="en-US" altLang="ja-JP" sz="1200" dirty="0" smtClean="0"/>
+              <a:t>height=50px</a:t>
+            </a:r>
+            <a:endParaRPr kumimoji="1" lang="en-US" altLang="ja-JP" sz="1200" dirty="0" smtClean="0"/>
           </a:p>
         </p:txBody>
       </p:sp>
@@ -4009,7 +4048,7 @@
         </p:nvSpPr>
         <p:spPr>
           <a:xfrm>
-            <a:off x="5911864" y="2530970"/>
+            <a:off x="5885737" y="2487425"/>
             <a:ext cx="1833900" cy="646331"/>
           </a:xfrm>
           <a:prstGeom prst="rect">
@@ -4026,18 +4065,26 @@
             <a:pPr algn="ctr"/>
             <a:r>
               <a:rPr kumimoji="1" lang="en-US" altLang="ja-JP" sz="1200" dirty="0" smtClean="0"/>
-              <a:t>id=“panel_div-1”</a:t>
+              <a:t>id</a:t>
+            </a:r>
+            <a:r>
+              <a:rPr kumimoji="1" lang="en-US" altLang="ja-JP" sz="1200" dirty="0" smtClean="0"/>
+              <a:t>=“div_panel-1</a:t>
+            </a:r>
+            <a:r>
+              <a:rPr kumimoji="1" lang="en-US" altLang="ja-JP" sz="1200" dirty="0" smtClean="0"/>
+              <a:t>”</a:t>
             </a:r>
           </a:p>
           <a:p>
             <a:pPr algn="ctr"/>
             <a:r>
+              <a:rPr lang="en-US" altLang="ja-JP" sz="1200" dirty="0"/>
+              <a:t>margin: </a:t>
+            </a:r>
+            <a:r>
               <a:rPr lang="en-US" altLang="ja-JP" sz="1200" dirty="0" smtClean="0"/>
-              <a:t>margin: 0px,</a:t>
-            </a:r>
-            <a:r>
-              <a:rPr lang="en-US" altLang="ja-JP" sz="1200" dirty="0" smtClean="0"/>
-              <a:t> padding: 0px,</a:t>
+              <a:t>2px, padding: 1px,</a:t>
             </a:r>
           </a:p>
           <a:p>
@@ -4066,8 +4113,8 @@
         </p:nvSpPr>
         <p:spPr>
           <a:xfrm>
-            <a:off x="2911309" y="5129300"/>
-            <a:ext cx="1869165" cy="646331"/>
+            <a:off x="2902814" y="5085755"/>
+            <a:ext cx="1833900" cy="646331"/>
           </a:xfrm>
           <a:prstGeom prst="rect">
             <a:avLst/>
@@ -4083,18 +4130,26 @@
             <a:pPr algn="ctr"/>
             <a:r>
               <a:rPr kumimoji="1" lang="en-US" altLang="ja-JP" sz="1200" dirty="0" smtClean="0"/>
-              <a:t>id=“panel_div-2”</a:t>
+              <a:t>id</a:t>
+            </a:r>
+            <a:r>
+              <a:rPr kumimoji="1" lang="en-US" altLang="ja-JP" sz="1200" dirty="0" smtClean="0"/>
+              <a:t>=“div_panel-2</a:t>
+            </a:r>
+            <a:r>
+              <a:rPr kumimoji="1" lang="en-US" altLang="ja-JP" sz="1200" dirty="0" smtClean="0"/>
+              <a:t>”</a:t>
             </a:r>
           </a:p>
           <a:p>
             <a:pPr algn="ctr"/>
             <a:r>
+              <a:rPr lang="en-US" altLang="ja-JP" sz="1200" dirty="0"/>
+              <a:t>margin: </a:t>
+            </a:r>
+            <a:r>
               <a:rPr lang="en-US" altLang="ja-JP" sz="1200" dirty="0" smtClean="0"/>
-              <a:t>margin: 0px</a:t>
-            </a:r>
-            <a:r>
-              <a:rPr lang="en-US" altLang="ja-JP" sz="1200" dirty="0" smtClean="0"/>
-              <a:t>, padding: 0px,</a:t>
+              <a:t>2px, padding: 1px,</a:t>
             </a:r>
           </a:p>
           <a:p>
@@ -4123,7 +4178,7 @@
         </p:nvSpPr>
         <p:spPr>
           <a:xfrm>
-            <a:off x="5989789" y="5129300"/>
+            <a:off x="5963660" y="5085755"/>
             <a:ext cx="1869166" cy="646331"/>
           </a:xfrm>
           <a:prstGeom prst="rect">
@@ -4140,22 +4195,26 @@
             <a:pPr algn="ctr"/>
             <a:r>
               <a:rPr kumimoji="1" lang="en-US" altLang="ja-JP" sz="1200" dirty="0" smtClean="0"/>
-              <a:t>id=“panel_div-3”</a:t>
+              <a:t>id</a:t>
+            </a:r>
+            <a:r>
+              <a:rPr kumimoji="1" lang="en-US" altLang="ja-JP" sz="1200" dirty="0" smtClean="0"/>
+              <a:t>=“div_panel-3</a:t>
+            </a:r>
+            <a:r>
+              <a:rPr kumimoji="1" lang="en-US" altLang="ja-JP" sz="1200" dirty="0" smtClean="0"/>
+              <a:t>”</a:t>
             </a:r>
           </a:p>
           <a:p>
             <a:pPr algn="ctr"/>
             <a:r>
+              <a:rPr lang="en-US" altLang="ja-JP" sz="1200" dirty="0"/>
+              <a:t>margin: </a:t>
+            </a:r>
+            <a:r>
               <a:rPr lang="en-US" altLang="ja-JP" sz="1200" dirty="0" smtClean="0"/>
-              <a:t>margin: 0px</a:t>
-            </a:r>
-            <a:r>
-              <a:rPr lang="en-US" altLang="ja-JP" sz="1200" dirty="0" smtClean="0"/>
-              <a:t>, padding: 0px,</a:t>
-            </a:r>
-            <a:r>
-              <a:rPr lang="en-US" altLang="ja-JP" sz="1200" dirty="0" smtClean="0"/>
-              <a:t> </a:t>
+              <a:t>2px, padding: 1px, </a:t>
             </a:r>
           </a:p>
           <a:p>
@@ -4180,7 +4239,7 @@
         </p:nvCxnSpPr>
         <p:spPr>
           <a:xfrm flipH="1" flipV="1">
-            <a:off x="8325840" y="1500689"/>
+            <a:off x="8299713" y="6603918"/>
             <a:ext cx="335284" cy="3783"/>
           </a:xfrm>
           <a:prstGeom prst="straightConnector1">
@@ -4216,7 +4275,7 @@
         </p:nvSpPr>
         <p:spPr>
           <a:xfrm>
-            <a:off x="8608829" y="1351620"/>
+            <a:off x="8582702" y="6533230"/>
             <a:ext cx="407611" cy="276999"/>
           </a:xfrm>
           <a:prstGeom prst="rect">
@@ -4233,7 +4292,7 @@
             <a:pPr algn="ctr"/>
             <a:r>
               <a:rPr lang="en-US" altLang="ja-JP" sz="1200" dirty="0" smtClean="0"/>
-              <a:t>5px</a:t>
+              <a:t>4px</a:t>
             </a:r>
             <a:endParaRPr lang="ja-JP" altLang="en-US" sz="1200" dirty="0"/>
           </a:p>
@@ -4247,7 +4306,7 @@
         </p:nvCxnSpPr>
         <p:spPr>
           <a:xfrm flipH="1" flipV="1">
-            <a:off x="8312772" y="4065366"/>
+            <a:off x="8286645" y="4021821"/>
             <a:ext cx="335284" cy="3783"/>
           </a:xfrm>
           <a:prstGeom prst="straightConnector1">
@@ -4283,7 +4342,7 @@
         </p:nvSpPr>
         <p:spPr>
           <a:xfrm>
-            <a:off x="8595761" y="3916297"/>
+            <a:off x="8569634" y="3872752"/>
             <a:ext cx="407611" cy="276999"/>
           </a:xfrm>
           <a:prstGeom prst="rect">
@@ -4300,7 +4359,7 @@
             <a:pPr algn="ctr"/>
             <a:r>
               <a:rPr lang="en-US" altLang="ja-JP" sz="1200" dirty="0" smtClean="0"/>
-              <a:t>5px</a:t>
+              <a:t>4px</a:t>
             </a:r>
             <a:endParaRPr lang="ja-JP" altLang="en-US" sz="1200" dirty="0"/>
           </a:p>
@@ -4314,7 +4373,7 @@
         </p:nvCxnSpPr>
         <p:spPr>
           <a:xfrm flipH="1" flipV="1">
-            <a:off x="5368829" y="6555382"/>
+            <a:off x="5342702" y="6511837"/>
             <a:ext cx="229610" cy="192234"/>
           </a:xfrm>
           <a:prstGeom prst="straightConnector1">
@@ -4350,7 +4409,7 @@
         </p:nvSpPr>
         <p:spPr>
           <a:xfrm>
-            <a:off x="5526490" y="6603473"/>
+            <a:off x="5500363" y="6638309"/>
             <a:ext cx="407611" cy="276999"/>
           </a:xfrm>
           <a:prstGeom prst="rect">
@@ -4367,7 +4426,7 @@
             <a:pPr algn="ctr"/>
             <a:r>
               <a:rPr lang="en-US" altLang="ja-JP" sz="1200" dirty="0" smtClean="0"/>
-              <a:t>5px</a:t>
+              <a:t>4px</a:t>
             </a:r>
             <a:endParaRPr lang="ja-JP" altLang="en-US" sz="1200" dirty="0"/>
           </a:p>
@@ -4381,8 +4440,8 @@
         </p:nvSpPr>
         <p:spPr>
           <a:xfrm>
-            <a:off x="2618717" y="1546084"/>
-            <a:ext cx="2297553" cy="276999"/>
+            <a:off x="2602273" y="1502539"/>
+            <a:ext cx="2278188" cy="276999"/>
           </a:xfrm>
           <a:prstGeom prst="rect">
             <a:avLst/>
@@ -4398,7 +4457,7 @@
             <a:pPr algn="ctr"/>
             <a:r>
               <a:rPr kumimoji="1" lang="en-US" altLang="ja-JP" sz="1200" dirty="0" smtClean="0"/>
-              <a:t>width=(100%-140px-5*(Nx-1))/</a:t>
+              <a:t>width=(100%-140-4-4*(Nx-1))/</a:t>
             </a:r>
             <a:r>
               <a:rPr kumimoji="1" lang="en-US" altLang="ja-JP" sz="1200" dirty="0" err="1" smtClean="0"/>
@@ -4410,14 +4469,14 @@
       </p:sp>
       <p:sp>
         <p:nvSpPr>
-          <p:cNvPr id="43" name="テキスト ボックス 42"/>
+          <p:cNvPr id="30" name="テキスト ボックス 29"/>
           <p:cNvSpPr txBox="1"/>
           <p:nvPr/>
         </p:nvSpPr>
         <p:spPr>
-          <a:xfrm>
-            <a:off x="8982952" y="1369884"/>
-            <a:ext cx="1968809" cy="261610"/>
+          <a:xfrm rot="16200000">
+            <a:off x="1416434" y="2642014"/>
+            <a:ext cx="2050754" cy="276999"/>
           </a:xfrm>
           <a:prstGeom prst="rect">
             <a:avLst/>
@@ -4431,18 +4490,211 @@
           <a:lstStyle/>
           <a:p>
             <a:r>
-              <a:rPr kumimoji="1" lang="ja-JP" altLang="en-US" sz="1100" dirty="0" smtClean="0"/>
-              <a:t>←下の要素の</a:t>
-            </a:r>
-            <a:r>
-              <a:rPr kumimoji="1" lang="en-US" altLang="ja-JP" sz="1100" dirty="0" smtClean="0"/>
-              <a:t>margin</a:t>
-            </a:r>
-            <a:r>
-              <a:rPr kumimoji="1" lang="ja-JP" altLang="en-US" sz="1100" dirty="0" smtClean="0"/>
-              <a:t>で表現？</a:t>
-            </a:r>
-            <a:endParaRPr kumimoji="1" lang="ja-JP" altLang="en-US" sz="1100" dirty="0"/>
+              <a:rPr kumimoji="1" lang="en-US" altLang="ja-JP" sz="1200" dirty="0" smtClean="0"/>
+              <a:t>Height=100%-50-4</a:t>
+            </a:r>
+            <a:r>
+              <a:rPr kumimoji="1" lang="en-US" altLang="ja-JP" sz="1200" dirty="0" smtClean="0"/>
+              <a:t>*(</a:t>
+            </a:r>
+            <a:r>
+              <a:rPr kumimoji="1" lang="en-US" altLang="ja-JP" sz="1200" dirty="0" err="1" smtClean="0"/>
+              <a:t>Ny</a:t>
+            </a:r>
+            <a:r>
+              <a:rPr kumimoji="1" lang="en-US" altLang="ja-JP" sz="1200" dirty="0" smtClean="0"/>
+              <a:t>/1)/</a:t>
+            </a:r>
+            <a:r>
+              <a:rPr kumimoji="1" lang="en-US" altLang="ja-JP" sz="1200" dirty="0" err="1" smtClean="0"/>
+              <a:t>Ny</a:t>
+            </a:r>
+            <a:endParaRPr kumimoji="1" lang="ja-JP" altLang="en-US" sz="1200" dirty="0"/>
+          </a:p>
+        </p:txBody>
+      </p:sp>
+      <p:sp>
+        <p:nvSpPr>
+          <p:cNvPr id="2" name="正方形/長方形 1"/>
+          <p:cNvSpPr/>
+          <p:nvPr/>
+        </p:nvSpPr>
+        <p:spPr>
+          <a:xfrm>
+            <a:off x="6396678" y="58054"/>
+            <a:ext cx="2593635" cy="646331"/>
+          </a:xfrm>
+          <a:prstGeom prst="rect">
+            <a:avLst/>
+          </a:prstGeom>
+        </p:spPr>
+        <p:txBody>
+          <a:bodyPr wrap="square">
+            <a:spAutoFit/>
+          </a:bodyPr>
+          <a:lstStyle/>
+          <a:p>
+            <a:r>
+              <a:rPr lang="en-US" altLang="ja-JP" sz="1200" dirty="0" err="1" smtClean="0"/>
+              <a:t>div_panel-i</a:t>
+            </a:r>
+            <a:r>
+              <a:rPr lang="en-US" altLang="ja-JP" sz="1200" dirty="0" smtClean="0"/>
+              <a:t>: constrain within </a:t>
+            </a:r>
+            <a:r>
+              <a:rPr lang="en-US" altLang="ja-JP" sz="1200" dirty="0" err="1" smtClean="0"/>
+              <a:t>div_panel</a:t>
+            </a:r>
+            <a:endParaRPr lang="en-US" altLang="ja-JP" sz="1200" dirty="0" smtClean="0"/>
+          </a:p>
+          <a:p>
+            <a:r>
+              <a:rPr lang="ja-JP" altLang="en-US" sz="1200" dirty="0" smtClean="0"/>
+              <a:t>https</a:t>
+            </a:r>
+            <a:r>
+              <a:rPr lang="ja-JP" altLang="en-US" sz="1200" dirty="0"/>
+              <a:t>://jqueryui.com/draggable/#constrain-movement</a:t>
+            </a:r>
+          </a:p>
+        </p:txBody>
+      </p:sp>
+      <p:sp>
+        <p:nvSpPr>
+          <p:cNvPr id="3" name="テキスト ボックス 2"/>
+          <p:cNvSpPr txBox="1"/>
+          <p:nvPr/>
+        </p:nvSpPr>
+        <p:spPr>
+          <a:xfrm>
+            <a:off x="2264224" y="16473"/>
+            <a:ext cx="2363147" cy="646331"/>
+          </a:xfrm>
+          <a:prstGeom prst="rect">
+            <a:avLst/>
+          </a:prstGeom>
+          <a:noFill/>
+        </p:spPr>
+        <p:txBody>
+          <a:bodyPr wrap="none" rtlCol="0">
+            <a:spAutoFit/>
+          </a:bodyPr>
+          <a:lstStyle/>
+          <a:p>
+            <a:r>
+              <a:rPr kumimoji="1" lang="en-US" altLang="ja-JP" sz="1200" dirty="0" err="1" smtClean="0"/>
+              <a:t>draggable</a:t>
+            </a:r>
+            <a:r>
+              <a:rPr kumimoji="1" lang="en-US" altLang="ja-JP" sz="1200" dirty="0" smtClean="0"/>
+              <a:t>/non-</a:t>
+            </a:r>
+            <a:r>
+              <a:rPr kumimoji="1" lang="en-US" altLang="ja-JP" sz="1200" dirty="0" err="1" smtClean="0"/>
+              <a:t>draggable</a:t>
+            </a:r>
+            <a:endParaRPr kumimoji="1" lang="en-US" altLang="ja-JP" sz="1200" dirty="0" smtClean="0"/>
+          </a:p>
+          <a:p>
+            <a:r>
+              <a:rPr lang="en-US" altLang="ja-JP" sz="1200" dirty="0" smtClean="0"/>
+              <a:t>resizable/non-resizable</a:t>
+            </a:r>
+          </a:p>
+          <a:p>
+            <a:r>
+              <a:rPr lang="ja-JP" altLang="en-US" sz="1200" dirty="0" smtClean="0"/>
+              <a:t>はチェックボックスで切り替え可能</a:t>
+            </a:r>
+            <a:endParaRPr kumimoji="1" lang="ja-JP" altLang="en-US" sz="1200" dirty="0"/>
+          </a:p>
+        </p:txBody>
+      </p:sp>
+      <p:cxnSp>
+        <p:nvCxnSpPr>
+          <p:cNvPr id="11" name="直線矢印コネクタ 10"/>
+          <p:cNvCxnSpPr/>
+          <p:nvPr/>
+        </p:nvCxnSpPr>
+        <p:spPr>
+          <a:xfrm flipH="1">
+            <a:off x="2379306" y="567136"/>
+            <a:ext cx="902258" cy="1056391"/>
+          </a:xfrm>
+          <a:prstGeom prst="straightConnector1">
+            <a:avLst/>
+          </a:prstGeom>
+          <a:ln>
+            <a:tailEnd type="triangle"/>
+          </a:ln>
+        </p:spPr>
+        <p:style>
+          <a:lnRef idx="1">
+            <a:schemeClr val="accent1"/>
+          </a:lnRef>
+          <a:fillRef idx="0">
+            <a:schemeClr val="accent1"/>
+          </a:fillRef>
+          <a:effectRef idx="0">
+            <a:schemeClr val="accent1"/>
+          </a:effectRef>
+          <a:fontRef idx="minor">
+            <a:schemeClr val="tx1"/>
+          </a:fontRef>
+        </p:style>
+      </p:cxnSp>
+      <p:sp>
+        <p:nvSpPr>
+          <p:cNvPr id="12" name="テキスト ボックス 11"/>
+          <p:cNvSpPr txBox="1"/>
+          <p:nvPr/>
+        </p:nvSpPr>
+        <p:spPr>
+          <a:xfrm>
+            <a:off x="2232311" y="6577349"/>
+            <a:ext cx="2484976" cy="276999"/>
+          </a:xfrm>
+          <a:prstGeom prst="rect">
+            <a:avLst/>
+          </a:prstGeom>
+          <a:noFill/>
+        </p:spPr>
+        <p:txBody>
+          <a:bodyPr wrap="none" rtlCol="0">
+            <a:spAutoFit/>
+          </a:bodyPr>
+          <a:lstStyle/>
+          <a:p>
+            <a:r>
+              <a:rPr kumimoji="1" lang="ja-JP" altLang="en-US" sz="1200" dirty="0" smtClean="0"/>
+              <a:t>列の数</a:t>
+            </a:r>
+            <a:r>
+              <a:rPr kumimoji="1" lang="en-US" altLang="ja-JP" sz="1200" dirty="0" err="1" smtClean="0"/>
+              <a:t>Nx</a:t>
+            </a:r>
+            <a:r>
+              <a:rPr kumimoji="1" lang="ja-JP" altLang="en-US" sz="1200" dirty="0" smtClean="0"/>
+              <a:t>：</a:t>
+            </a:r>
+            <a:r>
+              <a:rPr kumimoji="1" lang="en-US" altLang="ja-JP" sz="1200" dirty="0" err="1" smtClean="0"/>
+              <a:t>sqrt</a:t>
+            </a:r>
+            <a:r>
+              <a:rPr kumimoji="1" lang="en-US" altLang="ja-JP" sz="1200" dirty="0" smtClean="0"/>
+              <a:t>(</a:t>
+            </a:r>
+            <a:r>
+              <a:rPr lang="en-US" altLang="ja-JP" sz="1200" dirty="0" smtClean="0"/>
+              <a:t>N)</a:t>
+            </a:r>
+            <a:r>
+              <a:rPr lang="ja-JP" altLang="en-US" sz="1200" dirty="0" smtClean="0"/>
+              <a:t>を切り上げた整数</a:t>
+            </a:r>
+            <a:endParaRPr kumimoji="1" lang="ja-JP" altLang="en-US" sz="1200" dirty="0"/>
           </a:p>
         </p:txBody>
       </p:sp>
@@ -4450,6 +4702,795 @@
     <p:extLst>
       <p:ext uri="{BB962C8B-B14F-4D97-AF65-F5344CB8AC3E}">
         <p14:creationId xmlns:p14="http://schemas.microsoft.com/office/powerpoint/2010/main" val="1500431848"/>
+      </p:ext>
+    </p:extLst>
+  </p:cSld>
+  <p:clrMapOvr>
+    <a:masterClrMapping/>
+  </p:clrMapOvr>
+</p:sld>
+</file>
+
+<file path=ppt/slides/slide2.xml><?xml version="1.0" encoding="utf-8"?>
+<p:sld xmlns:a="http://schemas.openxmlformats.org/drawingml/2006/main" xmlns:r="http://schemas.openxmlformats.org/officeDocument/2006/relationships" xmlns:p="http://schemas.openxmlformats.org/presentationml/2006/main">
+  <p:cSld>
+    <p:spTree>
+      <p:nvGrpSpPr>
+        <p:cNvPr id="1" name=""/>
+        <p:cNvGrpSpPr/>
+        <p:nvPr/>
+      </p:nvGrpSpPr>
+      <p:grpSpPr>
+        <a:xfrm>
+          <a:off x="0" y="0"/>
+          <a:ext cx="0" cy="0"/>
+          <a:chOff x="0" y="0"/>
+          <a:chExt cx="0" cy="0"/>
+        </a:xfrm>
+      </p:grpSpPr>
+      <p:sp>
+        <p:nvSpPr>
+          <p:cNvPr id="2" name="正方形/長方形 1"/>
+          <p:cNvSpPr/>
+          <p:nvPr/>
+        </p:nvSpPr>
+        <p:spPr>
+          <a:xfrm>
+            <a:off x="905692" y="486352"/>
+            <a:ext cx="7548596" cy="5931865"/>
+          </a:xfrm>
+          <a:prstGeom prst="rect">
+            <a:avLst/>
+          </a:prstGeom>
+          <a:noFill/>
+          <a:ln w="31750">
+            <a:solidFill>
+              <a:schemeClr val="tx1">
+                <a:alpha val="50000"/>
+              </a:schemeClr>
+            </a:solidFill>
+          </a:ln>
+        </p:spPr>
+        <p:style>
+          <a:lnRef idx="2">
+            <a:schemeClr val="accent1">
+              <a:shade val="50000"/>
+            </a:schemeClr>
+          </a:lnRef>
+          <a:fillRef idx="1">
+            <a:schemeClr val="accent1"/>
+          </a:fillRef>
+          <a:effectRef idx="0">
+            <a:schemeClr val="accent1"/>
+          </a:effectRef>
+          <a:fontRef idx="minor">
+            <a:schemeClr val="lt1"/>
+          </a:fontRef>
+        </p:style>
+        <p:txBody>
+          <a:bodyPr rtlCol="0" anchor="ctr"/>
+          <a:lstStyle/>
+          <a:p>
+            <a:pPr algn="ctr"/>
+            <a:endParaRPr kumimoji="1" lang="ja-JP" altLang="en-US"/>
+          </a:p>
+        </p:txBody>
+      </p:sp>
+      <p:sp>
+        <p:nvSpPr>
+          <p:cNvPr id="3" name="テキスト ボックス 2"/>
+          <p:cNvSpPr txBox="1"/>
+          <p:nvPr/>
+        </p:nvSpPr>
+        <p:spPr>
+          <a:xfrm>
+            <a:off x="34075" y="70853"/>
+            <a:ext cx="1189236" cy="276999"/>
+          </a:xfrm>
+          <a:prstGeom prst="rect">
+            <a:avLst/>
+          </a:prstGeom>
+          <a:noFill/>
+        </p:spPr>
+        <p:txBody>
+          <a:bodyPr wrap="none" rtlCol="0">
+            <a:spAutoFit/>
+          </a:bodyPr>
+          <a:lstStyle/>
+          <a:p>
+            <a:pPr algn="ctr"/>
+            <a:r>
+              <a:rPr kumimoji="1" lang="en-US" altLang="ja-JP" sz="1200" dirty="0" smtClean="0"/>
+              <a:t>id</a:t>
+            </a:r>
+            <a:r>
+              <a:rPr kumimoji="1" lang="en-US" altLang="ja-JP" sz="1200" dirty="0" smtClean="0"/>
+              <a:t>=“</a:t>
+            </a:r>
+            <a:r>
+              <a:rPr kumimoji="1" lang="en-US" altLang="ja-JP" sz="1200" dirty="0" err="1" smtClean="0"/>
+              <a:t>div_panel-i</a:t>
+            </a:r>
+            <a:r>
+              <a:rPr kumimoji="1" lang="en-US" altLang="ja-JP" sz="1200" dirty="0" smtClean="0"/>
+              <a:t>”</a:t>
+            </a:r>
+          </a:p>
+        </p:txBody>
+      </p:sp>
+      <p:sp>
+        <p:nvSpPr>
+          <p:cNvPr id="5" name="テキスト ボックス 4"/>
+          <p:cNvSpPr txBox="1"/>
+          <p:nvPr/>
+        </p:nvSpPr>
+        <p:spPr>
+          <a:xfrm>
+            <a:off x="3203164" y="209353"/>
+            <a:ext cx="2278188" cy="276999"/>
+          </a:xfrm>
+          <a:prstGeom prst="rect">
+            <a:avLst/>
+          </a:prstGeom>
+          <a:noFill/>
+        </p:spPr>
+        <p:txBody>
+          <a:bodyPr wrap="none" rtlCol="0">
+            <a:spAutoFit/>
+          </a:bodyPr>
+          <a:lstStyle/>
+          <a:p>
+            <a:pPr algn="ctr"/>
+            <a:r>
+              <a:rPr kumimoji="1" lang="en-US" altLang="ja-JP" sz="1200" dirty="0" smtClean="0"/>
+              <a:t>width=(100%-140-4-4*(Nx-1))/</a:t>
+            </a:r>
+            <a:r>
+              <a:rPr kumimoji="1" lang="en-US" altLang="ja-JP" sz="1200" dirty="0" err="1" smtClean="0"/>
+              <a:t>Nx</a:t>
+            </a:r>
+            <a:endParaRPr kumimoji="1" lang="en-US" altLang="ja-JP" sz="1200" dirty="0" smtClean="0"/>
+          </a:p>
+        </p:txBody>
+      </p:sp>
+      <p:sp>
+        <p:nvSpPr>
+          <p:cNvPr id="6" name="テキスト ボックス 5"/>
+          <p:cNvSpPr txBox="1"/>
+          <p:nvPr/>
+        </p:nvSpPr>
+        <p:spPr>
+          <a:xfrm rot="16200000">
+            <a:off x="-258184" y="2990618"/>
+            <a:ext cx="2050754" cy="276999"/>
+          </a:xfrm>
+          <a:prstGeom prst="rect">
+            <a:avLst/>
+          </a:prstGeom>
+          <a:noFill/>
+        </p:spPr>
+        <p:txBody>
+          <a:bodyPr wrap="none" rtlCol="0">
+            <a:spAutoFit/>
+          </a:bodyPr>
+          <a:lstStyle/>
+          <a:p>
+            <a:r>
+              <a:rPr kumimoji="1" lang="en-US" altLang="ja-JP" sz="1200" dirty="0" smtClean="0"/>
+              <a:t>Height=100%-20-4*(</a:t>
+            </a:r>
+            <a:r>
+              <a:rPr kumimoji="1" lang="en-US" altLang="ja-JP" sz="1200" dirty="0" err="1" smtClean="0"/>
+              <a:t>Ny</a:t>
+            </a:r>
+            <a:r>
+              <a:rPr kumimoji="1" lang="en-US" altLang="ja-JP" sz="1200" dirty="0" smtClean="0"/>
+              <a:t>/1)/</a:t>
+            </a:r>
+            <a:r>
+              <a:rPr kumimoji="1" lang="en-US" altLang="ja-JP" sz="1200" dirty="0" err="1" smtClean="0"/>
+              <a:t>Ny</a:t>
+            </a:r>
+            <a:endParaRPr kumimoji="1" lang="ja-JP" altLang="en-US" sz="1200" dirty="0"/>
+          </a:p>
+        </p:txBody>
+      </p:sp>
+      <p:sp>
+        <p:nvSpPr>
+          <p:cNvPr id="8" name="正方形/長方形 7"/>
+          <p:cNvSpPr/>
+          <p:nvPr/>
+        </p:nvSpPr>
+        <p:spPr>
+          <a:xfrm>
+            <a:off x="988420" y="1262743"/>
+            <a:ext cx="7389226" cy="5155474"/>
+          </a:xfrm>
+          <a:prstGeom prst="rect">
+            <a:avLst/>
+          </a:prstGeom>
+          <a:noFill/>
+          <a:ln w="31750">
+            <a:solidFill>
+              <a:schemeClr val="accent4">
+                <a:lumMod val="50000"/>
+                <a:alpha val="50000"/>
+              </a:schemeClr>
+            </a:solidFill>
+          </a:ln>
+        </p:spPr>
+        <p:style>
+          <a:lnRef idx="2">
+            <a:schemeClr val="accent1">
+              <a:shade val="50000"/>
+            </a:schemeClr>
+          </a:lnRef>
+          <a:fillRef idx="1">
+            <a:schemeClr val="accent1"/>
+          </a:fillRef>
+          <a:effectRef idx="0">
+            <a:schemeClr val="accent1"/>
+          </a:effectRef>
+          <a:fontRef idx="minor">
+            <a:schemeClr val="lt1"/>
+          </a:fontRef>
+        </p:style>
+        <p:txBody>
+          <a:bodyPr rtlCol="0" anchor="ctr"/>
+          <a:lstStyle/>
+          <a:p>
+            <a:pPr algn="ctr"/>
+            <a:endParaRPr kumimoji="1" lang="ja-JP" altLang="en-US"/>
+          </a:p>
+        </p:txBody>
+      </p:sp>
+      <p:sp>
+        <p:nvSpPr>
+          <p:cNvPr id="9" name="正方形/長方形 8"/>
+          <p:cNvSpPr/>
+          <p:nvPr/>
+        </p:nvSpPr>
+        <p:spPr>
+          <a:xfrm>
+            <a:off x="988420" y="557349"/>
+            <a:ext cx="7389226" cy="635725"/>
+          </a:xfrm>
+          <a:prstGeom prst="rect">
+            <a:avLst/>
+          </a:prstGeom>
+          <a:noFill/>
+          <a:ln w="31750">
+            <a:solidFill>
+              <a:schemeClr val="accent6">
+                <a:lumMod val="50000"/>
+                <a:alpha val="50000"/>
+              </a:schemeClr>
+            </a:solidFill>
+          </a:ln>
+        </p:spPr>
+        <p:style>
+          <a:lnRef idx="2">
+            <a:schemeClr val="accent1">
+              <a:shade val="50000"/>
+            </a:schemeClr>
+          </a:lnRef>
+          <a:fillRef idx="1">
+            <a:schemeClr val="accent1"/>
+          </a:fillRef>
+          <a:effectRef idx="0">
+            <a:schemeClr val="accent1"/>
+          </a:effectRef>
+          <a:fontRef idx="minor">
+            <a:schemeClr val="lt1"/>
+          </a:fontRef>
+        </p:style>
+        <p:txBody>
+          <a:bodyPr rtlCol="0" anchor="ctr"/>
+          <a:lstStyle/>
+          <a:p>
+            <a:pPr algn="ctr"/>
+            <a:endParaRPr kumimoji="1" lang="ja-JP" altLang="en-US"/>
+          </a:p>
+        </p:txBody>
+      </p:sp>
+      <p:sp>
+        <p:nvSpPr>
+          <p:cNvPr id="11" name="正方形/長方形 10"/>
+          <p:cNvSpPr/>
+          <p:nvPr/>
+        </p:nvSpPr>
+        <p:spPr>
+          <a:xfrm>
+            <a:off x="1053733" y="1322864"/>
+            <a:ext cx="3579227" cy="2437006"/>
+          </a:xfrm>
+          <a:prstGeom prst="rect">
+            <a:avLst/>
+          </a:prstGeom>
+          <a:noFill/>
+          <a:ln w="31750">
+            <a:solidFill>
+              <a:srgbClr val="FF0000">
+                <a:alpha val="50000"/>
+              </a:srgbClr>
+            </a:solidFill>
+          </a:ln>
+        </p:spPr>
+        <p:style>
+          <a:lnRef idx="2">
+            <a:schemeClr val="accent1">
+              <a:shade val="50000"/>
+            </a:schemeClr>
+          </a:lnRef>
+          <a:fillRef idx="1">
+            <a:schemeClr val="accent1"/>
+          </a:fillRef>
+          <a:effectRef idx="0">
+            <a:schemeClr val="accent1"/>
+          </a:effectRef>
+          <a:fontRef idx="minor">
+            <a:schemeClr val="lt1"/>
+          </a:fontRef>
+        </p:style>
+        <p:txBody>
+          <a:bodyPr rtlCol="0" anchor="ctr"/>
+          <a:lstStyle/>
+          <a:p>
+            <a:pPr algn="ctr"/>
+            <a:endParaRPr kumimoji="1" lang="ja-JP" altLang="en-US"/>
+          </a:p>
+        </p:txBody>
+      </p:sp>
+      <p:sp>
+        <p:nvSpPr>
+          <p:cNvPr id="12" name="テキスト ボックス 11"/>
+          <p:cNvSpPr txBox="1"/>
+          <p:nvPr/>
+        </p:nvSpPr>
+        <p:spPr>
+          <a:xfrm>
+            <a:off x="1715163" y="2779042"/>
+            <a:ext cx="1965731" cy="461665"/>
+          </a:xfrm>
+          <a:prstGeom prst="rect">
+            <a:avLst/>
+          </a:prstGeom>
+          <a:noFill/>
+        </p:spPr>
+        <p:txBody>
+          <a:bodyPr wrap="none" rtlCol="0">
+            <a:spAutoFit/>
+          </a:bodyPr>
+          <a:lstStyle/>
+          <a:p>
+            <a:r>
+              <a:rPr kumimoji="1" lang="en-US" altLang="ja-JP" sz="1200" dirty="0" smtClean="0"/>
+              <a:t>Figure</a:t>
+            </a:r>
+          </a:p>
+          <a:p>
+            <a:r>
+              <a:rPr lang="en-US" altLang="ja-JP" sz="1200" dirty="0" smtClean="0"/>
+              <a:t>(position: center relative to )</a:t>
+            </a:r>
+            <a:endParaRPr kumimoji="1" lang="ja-JP" altLang="en-US" sz="1200" dirty="0"/>
+          </a:p>
+        </p:txBody>
+      </p:sp>
+      <p:sp>
+        <p:nvSpPr>
+          <p:cNvPr id="13" name="テキスト ボックス 12"/>
+          <p:cNvSpPr txBox="1"/>
+          <p:nvPr/>
+        </p:nvSpPr>
+        <p:spPr>
+          <a:xfrm>
+            <a:off x="3584328" y="555449"/>
+            <a:ext cx="1869165" cy="461665"/>
+          </a:xfrm>
+          <a:prstGeom prst="rect">
+            <a:avLst/>
+          </a:prstGeom>
+          <a:noFill/>
+        </p:spPr>
+        <p:txBody>
+          <a:bodyPr wrap="none" rtlCol="0">
+            <a:spAutoFit/>
+          </a:bodyPr>
+          <a:lstStyle/>
+          <a:p>
+            <a:pPr algn="ctr"/>
+            <a:r>
+              <a:rPr kumimoji="1" lang="en-US" altLang="ja-JP" sz="1200" dirty="0" smtClean="0"/>
+              <a:t>id</a:t>
+            </a:r>
+            <a:r>
+              <a:rPr kumimoji="1" lang="en-US" altLang="ja-JP" sz="1200" dirty="0" smtClean="0"/>
+              <a:t>=“</a:t>
+            </a:r>
+            <a:r>
+              <a:rPr kumimoji="1" lang="en-US" altLang="ja-JP" sz="1200" dirty="0" err="1" smtClean="0"/>
+              <a:t>div_controller_form-i</a:t>
+            </a:r>
+            <a:r>
+              <a:rPr kumimoji="1" lang="en-US" altLang="ja-JP" sz="1200" dirty="0" smtClean="0"/>
+              <a:t>”</a:t>
+            </a:r>
+          </a:p>
+          <a:p>
+            <a:pPr algn="ctr"/>
+            <a:r>
+              <a:rPr lang="en-US" altLang="ja-JP" sz="1200" dirty="0" smtClean="0"/>
+              <a:t>margin: 2px,  padding: 1px</a:t>
+            </a:r>
+          </a:p>
+        </p:txBody>
+      </p:sp>
+      <p:sp>
+        <p:nvSpPr>
+          <p:cNvPr id="14" name="テキスト ボックス 13"/>
+          <p:cNvSpPr txBox="1"/>
+          <p:nvPr/>
+        </p:nvSpPr>
+        <p:spPr>
+          <a:xfrm>
+            <a:off x="3426911" y="6396335"/>
+            <a:ext cx="1830694" cy="461665"/>
+          </a:xfrm>
+          <a:prstGeom prst="rect">
+            <a:avLst/>
+          </a:prstGeom>
+          <a:noFill/>
+        </p:spPr>
+        <p:txBody>
+          <a:bodyPr wrap="none" rtlCol="0">
+            <a:spAutoFit/>
+          </a:bodyPr>
+          <a:lstStyle/>
+          <a:p>
+            <a:pPr algn="ctr"/>
+            <a:r>
+              <a:rPr kumimoji="1" lang="en-US" altLang="ja-JP" sz="1200" dirty="0" smtClean="0"/>
+              <a:t>id</a:t>
+            </a:r>
+            <a:r>
+              <a:rPr kumimoji="1" lang="en-US" altLang="ja-JP" sz="1200" dirty="0" smtClean="0"/>
+              <a:t>=“</a:t>
+            </a:r>
+            <a:r>
+              <a:rPr kumimoji="1" lang="en-US" altLang="ja-JP" sz="1200" dirty="0" err="1" smtClean="0"/>
+              <a:t>div_draw_txt-i</a:t>
+            </a:r>
+            <a:r>
+              <a:rPr kumimoji="1" lang="en-US" altLang="ja-JP" sz="1200" dirty="0" smtClean="0"/>
+              <a:t>”</a:t>
+            </a:r>
+          </a:p>
+          <a:p>
+            <a:pPr algn="ctr"/>
+            <a:r>
+              <a:rPr lang="en-US" altLang="ja-JP" sz="1200" dirty="0" smtClean="0"/>
+              <a:t>margin: 2px,  padding: 1px</a:t>
+            </a:r>
+          </a:p>
+        </p:txBody>
+      </p:sp>
+      <p:sp>
+        <p:nvSpPr>
+          <p:cNvPr id="16" name="テキスト ボックス 15"/>
+          <p:cNvSpPr txBox="1"/>
+          <p:nvPr/>
+        </p:nvSpPr>
+        <p:spPr>
+          <a:xfrm>
+            <a:off x="1716158" y="1525119"/>
+            <a:ext cx="1867178" cy="461665"/>
+          </a:xfrm>
+          <a:prstGeom prst="rect">
+            <a:avLst/>
+          </a:prstGeom>
+          <a:noFill/>
+        </p:spPr>
+        <p:txBody>
+          <a:bodyPr wrap="none" rtlCol="0">
+            <a:spAutoFit/>
+          </a:bodyPr>
+          <a:lstStyle/>
+          <a:p>
+            <a:pPr algn="ctr"/>
+            <a:r>
+              <a:rPr kumimoji="1" lang="en-US" altLang="ja-JP" sz="1200" dirty="0" smtClean="0"/>
+              <a:t>id</a:t>
+            </a:r>
+            <a:r>
+              <a:rPr kumimoji="1" lang="en-US" altLang="ja-JP" sz="1200" dirty="0" smtClean="0"/>
+              <a:t>=“div_img-i-0”</a:t>
+            </a:r>
+            <a:endParaRPr kumimoji="1" lang="en-US" altLang="ja-JP" sz="1200" dirty="0" smtClean="0"/>
+          </a:p>
+          <a:p>
+            <a:pPr algn="ctr"/>
+            <a:r>
+              <a:rPr lang="en-US" altLang="ja-JP" sz="1200" dirty="0" smtClean="0"/>
+              <a:t>margin: 2px,  padding: 1px</a:t>
+            </a:r>
+          </a:p>
+        </p:txBody>
+      </p:sp>
+      <p:sp>
+        <p:nvSpPr>
+          <p:cNvPr id="21" name="正方形/長方形 20"/>
+          <p:cNvSpPr/>
+          <p:nvPr/>
+        </p:nvSpPr>
+        <p:spPr>
+          <a:xfrm>
+            <a:off x="4725214" y="1331574"/>
+            <a:ext cx="3579227" cy="2437006"/>
+          </a:xfrm>
+          <a:prstGeom prst="rect">
+            <a:avLst/>
+          </a:prstGeom>
+          <a:noFill/>
+          <a:ln w="31750">
+            <a:solidFill>
+              <a:srgbClr val="FF0000">
+                <a:alpha val="50000"/>
+              </a:srgbClr>
+            </a:solidFill>
+          </a:ln>
+        </p:spPr>
+        <p:style>
+          <a:lnRef idx="2">
+            <a:schemeClr val="accent1">
+              <a:shade val="50000"/>
+            </a:schemeClr>
+          </a:lnRef>
+          <a:fillRef idx="1">
+            <a:schemeClr val="accent1"/>
+          </a:fillRef>
+          <a:effectRef idx="0">
+            <a:schemeClr val="accent1"/>
+          </a:effectRef>
+          <a:fontRef idx="minor">
+            <a:schemeClr val="lt1"/>
+          </a:fontRef>
+        </p:style>
+        <p:txBody>
+          <a:bodyPr rtlCol="0" anchor="ctr"/>
+          <a:lstStyle/>
+          <a:p>
+            <a:pPr algn="ctr"/>
+            <a:endParaRPr kumimoji="1" lang="ja-JP" altLang="en-US"/>
+          </a:p>
+        </p:txBody>
+      </p:sp>
+      <p:sp>
+        <p:nvSpPr>
+          <p:cNvPr id="22" name="正方形/長方形 21"/>
+          <p:cNvSpPr/>
+          <p:nvPr/>
+        </p:nvSpPr>
+        <p:spPr>
+          <a:xfrm>
+            <a:off x="1053733" y="3864656"/>
+            <a:ext cx="3579227" cy="2437006"/>
+          </a:xfrm>
+          <a:prstGeom prst="rect">
+            <a:avLst/>
+          </a:prstGeom>
+          <a:noFill/>
+          <a:ln w="31750">
+            <a:solidFill>
+              <a:srgbClr val="FF0000">
+                <a:alpha val="50000"/>
+              </a:srgbClr>
+            </a:solidFill>
+          </a:ln>
+        </p:spPr>
+        <p:style>
+          <a:lnRef idx="2">
+            <a:schemeClr val="accent1">
+              <a:shade val="50000"/>
+            </a:schemeClr>
+          </a:lnRef>
+          <a:fillRef idx="1">
+            <a:schemeClr val="accent1"/>
+          </a:fillRef>
+          <a:effectRef idx="0">
+            <a:schemeClr val="accent1"/>
+          </a:effectRef>
+          <a:fontRef idx="minor">
+            <a:schemeClr val="lt1"/>
+          </a:fontRef>
+        </p:style>
+        <p:txBody>
+          <a:bodyPr rtlCol="0" anchor="ctr"/>
+          <a:lstStyle/>
+          <a:p>
+            <a:pPr algn="ctr"/>
+            <a:endParaRPr kumimoji="1" lang="ja-JP" altLang="en-US"/>
+          </a:p>
+        </p:txBody>
+      </p:sp>
+      <p:sp>
+        <p:nvSpPr>
+          <p:cNvPr id="23" name="正方形/長方形 22"/>
+          <p:cNvSpPr/>
+          <p:nvPr/>
+        </p:nvSpPr>
+        <p:spPr>
+          <a:xfrm>
+            <a:off x="4725214" y="3873366"/>
+            <a:ext cx="3579227" cy="2437006"/>
+          </a:xfrm>
+          <a:prstGeom prst="rect">
+            <a:avLst/>
+          </a:prstGeom>
+          <a:noFill/>
+          <a:ln w="31750">
+            <a:solidFill>
+              <a:srgbClr val="FF0000">
+                <a:alpha val="50000"/>
+              </a:srgbClr>
+            </a:solidFill>
+          </a:ln>
+        </p:spPr>
+        <p:style>
+          <a:lnRef idx="2">
+            <a:schemeClr val="accent1">
+              <a:shade val="50000"/>
+            </a:schemeClr>
+          </a:lnRef>
+          <a:fillRef idx="1">
+            <a:schemeClr val="accent1"/>
+          </a:fillRef>
+          <a:effectRef idx="0">
+            <a:schemeClr val="accent1"/>
+          </a:effectRef>
+          <a:fontRef idx="minor">
+            <a:schemeClr val="lt1"/>
+          </a:fontRef>
+        </p:style>
+        <p:txBody>
+          <a:bodyPr rtlCol="0" anchor="ctr"/>
+          <a:lstStyle/>
+          <a:p>
+            <a:pPr algn="ctr"/>
+            <a:endParaRPr kumimoji="1" lang="ja-JP" altLang="en-US"/>
+          </a:p>
+        </p:txBody>
+      </p:sp>
+      <p:sp>
+        <p:nvSpPr>
+          <p:cNvPr id="24" name="テキスト ボックス 23"/>
+          <p:cNvSpPr txBox="1"/>
+          <p:nvPr/>
+        </p:nvSpPr>
+        <p:spPr>
+          <a:xfrm>
+            <a:off x="5540277" y="1525118"/>
+            <a:ext cx="1867178" cy="461665"/>
+          </a:xfrm>
+          <a:prstGeom prst="rect">
+            <a:avLst/>
+          </a:prstGeom>
+          <a:noFill/>
+        </p:spPr>
+        <p:txBody>
+          <a:bodyPr wrap="none" rtlCol="0">
+            <a:spAutoFit/>
+          </a:bodyPr>
+          <a:lstStyle/>
+          <a:p>
+            <a:pPr algn="ctr"/>
+            <a:r>
+              <a:rPr kumimoji="1" lang="en-US" altLang="ja-JP" sz="1200" dirty="0" smtClean="0"/>
+              <a:t>id</a:t>
+            </a:r>
+            <a:r>
+              <a:rPr kumimoji="1" lang="en-US" altLang="ja-JP" sz="1200" dirty="0" smtClean="0"/>
+              <a:t>=“div_img-i-1”</a:t>
+            </a:r>
+            <a:endParaRPr kumimoji="1" lang="en-US" altLang="ja-JP" sz="1200" dirty="0" smtClean="0"/>
+          </a:p>
+          <a:p>
+            <a:pPr algn="ctr"/>
+            <a:r>
+              <a:rPr lang="en-US" altLang="ja-JP" sz="1200" dirty="0" smtClean="0"/>
+              <a:t>margin: 2px,  padding: 1px</a:t>
+            </a:r>
+          </a:p>
+        </p:txBody>
+      </p:sp>
+      <p:sp>
+        <p:nvSpPr>
+          <p:cNvPr id="25" name="テキスト ボックス 24"/>
+          <p:cNvSpPr txBox="1"/>
+          <p:nvPr/>
+        </p:nvSpPr>
+        <p:spPr>
+          <a:xfrm>
+            <a:off x="1813716" y="4670565"/>
+            <a:ext cx="1867178" cy="461665"/>
+          </a:xfrm>
+          <a:prstGeom prst="rect">
+            <a:avLst/>
+          </a:prstGeom>
+          <a:noFill/>
+        </p:spPr>
+        <p:txBody>
+          <a:bodyPr wrap="none" rtlCol="0">
+            <a:spAutoFit/>
+          </a:bodyPr>
+          <a:lstStyle/>
+          <a:p>
+            <a:pPr algn="ctr"/>
+            <a:r>
+              <a:rPr kumimoji="1" lang="en-US" altLang="ja-JP" sz="1200" dirty="0" smtClean="0"/>
+              <a:t>id</a:t>
+            </a:r>
+            <a:r>
+              <a:rPr kumimoji="1" lang="en-US" altLang="ja-JP" sz="1200" dirty="0" smtClean="0"/>
+              <a:t>=“div_img-i-2”</a:t>
+            </a:r>
+            <a:endParaRPr kumimoji="1" lang="en-US" altLang="ja-JP" sz="1200" dirty="0" smtClean="0"/>
+          </a:p>
+          <a:p>
+            <a:pPr algn="ctr"/>
+            <a:r>
+              <a:rPr lang="en-US" altLang="ja-JP" sz="1200" dirty="0" smtClean="0"/>
+              <a:t>margin: 2px,  padding: 1px</a:t>
+            </a:r>
+          </a:p>
+        </p:txBody>
+      </p:sp>
+      <p:sp>
+        <p:nvSpPr>
+          <p:cNvPr id="26" name="テキスト ボックス 25"/>
+          <p:cNvSpPr txBox="1"/>
+          <p:nvPr/>
+        </p:nvSpPr>
+        <p:spPr>
+          <a:xfrm>
+            <a:off x="5535678" y="4675869"/>
+            <a:ext cx="1867178" cy="461665"/>
+          </a:xfrm>
+          <a:prstGeom prst="rect">
+            <a:avLst/>
+          </a:prstGeom>
+          <a:noFill/>
+        </p:spPr>
+        <p:txBody>
+          <a:bodyPr wrap="none" rtlCol="0">
+            <a:spAutoFit/>
+          </a:bodyPr>
+          <a:lstStyle/>
+          <a:p>
+            <a:pPr algn="ctr"/>
+            <a:r>
+              <a:rPr kumimoji="1" lang="en-US" altLang="ja-JP" sz="1200" dirty="0" smtClean="0"/>
+              <a:t>id</a:t>
+            </a:r>
+            <a:r>
+              <a:rPr kumimoji="1" lang="en-US" altLang="ja-JP" sz="1200" dirty="0" smtClean="0"/>
+              <a:t>=“div_img-i-3”</a:t>
+            </a:r>
+            <a:endParaRPr kumimoji="1" lang="en-US" altLang="ja-JP" sz="1200" dirty="0" smtClean="0"/>
+          </a:p>
+          <a:p>
+            <a:pPr algn="ctr"/>
+            <a:r>
+              <a:rPr lang="en-US" altLang="ja-JP" sz="1200" dirty="0" smtClean="0"/>
+              <a:t>margin: 2px,  padding: 1px</a:t>
+            </a:r>
+          </a:p>
+        </p:txBody>
+      </p:sp>
+    </p:spTree>
+    <p:extLst>
+      <p:ext uri="{BB962C8B-B14F-4D97-AF65-F5344CB8AC3E}">
+        <p14:creationId xmlns:p14="http://schemas.microsoft.com/office/powerpoint/2010/main" val="4277533011"/>
       </p:ext>
     </p:extLst>
   </p:cSld>

</xml_diff>

<commit_message>
improve multipanel position and size
</commit_message>
<xml_diff>
--- a/disp.pptx
+++ b/disp.pptx
@@ -3490,11 +3490,27 @@
             </a:r>
             <a:r>
               <a:rPr kumimoji="1" lang="en-US" altLang="ja-JP" sz="1200" dirty="0" smtClean="0"/>
-              <a:t>”, margin: 2px, </a:t>
+              <a:t>”, margin: </a:t>
+            </a:r>
+            <a:r>
+              <a:rPr kumimoji="1" lang="en-US" altLang="ja-JP" sz="1200" dirty="0" smtClean="0"/>
+              <a:t>0px</a:t>
+            </a:r>
+            <a:r>
+              <a:rPr kumimoji="1" lang="en-US" altLang="ja-JP" sz="1200" dirty="0" smtClean="0"/>
+              <a:t>, </a:t>
             </a:r>
             <a:r>
               <a:rPr lang="en-US" altLang="ja-JP" sz="1200" dirty="0" smtClean="0"/>
-              <a:t>padding: 1px, </a:t>
+              <a:t>padding: </a:t>
+            </a:r>
+            <a:r>
+              <a:rPr lang="en-US" altLang="ja-JP" sz="1200" dirty="0" smtClean="0"/>
+              <a:t>3px</a:t>
+            </a:r>
+            <a:r>
+              <a:rPr lang="en-US" altLang="ja-JP" sz="1200" dirty="0" smtClean="0"/>
+              <a:t>, </a:t>
             </a:r>
             <a:r>
               <a:rPr lang="en-US" altLang="ja-JP" sz="1200" dirty="0" err="1" smtClean="0"/>
@@ -3812,7 +3828,23 @@
             <a:pPr algn="ctr"/>
             <a:r>
               <a:rPr lang="en-US" altLang="ja-JP" sz="1200" dirty="0" smtClean="0"/>
-              <a:t>margin: 2px,  padding: 1px,</a:t>
+              <a:t>margin: </a:t>
+            </a:r>
+            <a:r>
+              <a:rPr lang="en-US" altLang="ja-JP" sz="1200" dirty="0" smtClean="0"/>
+              <a:t>0px</a:t>
+            </a:r>
+            <a:r>
+              <a:rPr lang="en-US" altLang="ja-JP" sz="1200" dirty="0" smtClean="0"/>
+              <a:t>,  padding: </a:t>
+            </a:r>
+            <a:r>
+              <a:rPr lang="en-US" altLang="ja-JP" sz="1200" dirty="0" smtClean="0"/>
+              <a:t>3px</a:t>
+            </a:r>
+            <a:r>
+              <a:rPr lang="en-US" altLang="ja-JP" sz="1200" dirty="0" smtClean="0"/>
+              <a:t>,</a:t>
             </a:r>
           </a:p>
           <a:p>
@@ -3885,8 +3917,8 @@
         </p:nvSpPr>
         <p:spPr>
           <a:xfrm>
-            <a:off x="4471119" y="144879"/>
-            <a:ext cx="1795428" cy="461665"/>
+            <a:off x="4470511" y="144879"/>
+            <a:ext cx="1796646" cy="461665"/>
           </a:xfrm>
           <a:prstGeom prst="rect">
             <a:avLst/>
@@ -3910,18 +3942,31 @@
             </a:r>
             <a:r>
               <a:rPr kumimoji="1" lang="en-US" altLang="ja-JP" sz="1200" dirty="0" err="1" smtClean="0"/>
-              <a:t>div_panel</a:t>
+              <a:t>div_main</a:t>
             </a:r>
             <a:r>
               <a:rPr kumimoji="1" lang="en-US" altLang="ja-JP" sz="1200" dirty="0" smtClean="0"/>
-              <a:t>”</a:t>
-            </a:r>
-          </a:p>
-          <a:p>
-            <a:pPr algn="ctr"/>
+              <a:t>”, left: </a:t>
+            </a:r>
             <a:r>
               <a:rPr lang="en-US" altLang="ja-JP" sz="1200" dirty="0" smtClean="0"/>
-              <a:t>margin: 0px, padding: 5px</a:t>
+              <a:t>140px</a:t>
+            </a:r>
+            <a:endParaRPr lang="en-US" altLang="ja-JP" sz="1200" dirty="0"/>
+          </a:p>
+          <a:p>
+            <a:pPr algn="ctr"/>
+            <a:r>
+              <a:rPr lang="en-US" altLang="ja-JP" sz="1200" dirty="0" smtClean="0"/>
+              <a:t>margin</a:t>
+            </a:r>
+            <a:r>
+              <a:rPr lang="en-US" altLang="ja-JP" sz="1200" dirty="0" smtClean="0"/>
+              <a:t>: 0px, padding: </a:t>
+            </a:r>
+            <a:r>
+              <a:rPr lang="en-US" altLang="ja-JP" sz="1200" dirty="0" smtClean="0"/>
+              <a:t>0px</a:t>
             </a:r>
             <a:endParaRPr lang="ja-JP" altLang="en-US" sz="1200" dirty="0"/>
           </a:p>
@@ -3935,8 +3980,8 @@
         </p:nvSpPr>
         <p:spPr>
           <a:xfrm>
-            <a:off x="4106951" y="896986"/>
-            <a:ext cx="2238563" cy="276999"/>
+            <a:off x="4747415" y="896986"/>
+            <a:ext cx="957633" cy="276999"/>
           </a:xfrm>
           <a:prstGeom prst="rect">
             <a:avLst/>
@@ -3951,16 +3996,8 @@
           <a:p>
             <a:pPr algn="ctr"/>
             <a:r>
-              <a:rPr lang="en-US" altLang="ja-JP" sz="1200" dirty="0"/>
-              <a:t>w</a:t>
-            </a:r>
-            <a:r>
               <a:rPr kumimoji="1" lang="en-US" altLang="ja-JP" sz="1200" dirty="0" smtClean="0"/>
-              <a:t>idth=100%-140px, </a:t>
-            </a:r>
-            <a:r>
-              <a:rPr kumimoji="1" lang="en-US" altLang="ja-JP" sz="1200" dirty="0" smtClean="0"/>
-              <a:t>height=50px</a:t>
+              <a:t>height=30px</a:t>
             </a:r>
             <a:endParaRPr kumimoji="1" lang="en-US" altLang="ja-JP" sz="1200" dirty="0" smtClean="0"/>
           </a:p>
@@ -4108,7 +4145,19 @@
             </a:r>
             <a:r>
               <a:rPr lang="en-US" altLang="ja-JP" sz="1200" dirty="0" smtClean="0"/>
-              <a:t>2px, padding: 1px,</a:t>
+              <a:t>0px</a:t>
+            </a:r>
+            <a:r>
+              <a:rPr lang="en-US" altLang="ja-JP" sz="1200" dirty="0" smtClean="0"/>
+              <a:t>, padding: </a:t>
+            </a:r>
+            <a:r>
+              <a:rPr lang="en-US" altLang="ja-JP" sz="1200" dirty="0" smtClean="0"/>
+              <a:t>3px</a:t>
+            </a:r>
+            <a:r>
+              <a:rPr lang="en-US" altLang="ja-JP" sz="1200" dirty="0" smtClean="0"/>
+              <a:t>,</a:t>
             </a:r>
           </a:p>
           <a:p>
@@ -4185,7 +4234,19 @@
             </a:r>
             <a:r>
               <a:rPr lang="en-US" altLang="ja-JP" sz="1200" dirty="0" smtClean="0"/>
-              <a:t>2px, padding: 1px,</a:t>
+              <a:t>0px</a:t>
+            </a:r>
+            <a:r>
+              <a:rPr lang="en-US" altLang="ja-JP" sz="1200" dirty="0" smtClean="0"/>
+              <a:t>, padding: </a:t>
+            </a:r>
+            <a:r>
+              <a:rPr lang="en-US" altLang="ja-JP" sz="1200" dirty="0" smtClean="0"/>
+              <a:t>3px</a:t>
+            </a:r>
+            <a:r>
+              <a:rPr lang="en-US" altLang="ja-JP" sz="1200" dirty="0" smtClean="0"/>
+              <a:t>,</a:t>
             </a:r>
           </a:p>
           <a:p>
@@ -4249,7 +4310,7 @@
               <a:t>child_panel</a:t>
             </a:r>
             <a:r>
-              <a:rPr lang="en-US" altLang="ja-JP" sz="1200" smtClean="0"/>
+              <a:rPr lang="en-US" altLang="ja-JP" sz="1200" dirty="0" smtClean="0"/>
               <a:t>”</a:t>
             </a:r>
             <a:endParaRPr kumimoji="1" lang="en-US" altLang="ja-JP" sz="1200" dirty="0" smtClean="0"/>
@@ -4262,7 +4323,23 @@
             </a:r>
             <a:r>
               <a:rPr lang="en-US" altLang="ja-JP" sz="1200" dirty="0" smtClean="0"/>
-              <a:t>2px, padding: 1px, </a:t>
+              <a:t>0px</a:t>
+            </a:r>
+            <a:r>
+              <a:rPr lang="en-US" altLang="ja-JP" sz="1200" dirty="0" smtClean="0"/>
+              <a:t>, padding</a:t>
+            </a:r>
+            <a:r>
+              <a:rPr lang="en-US" altLang="ja-JP" sz="1200" smtClean="0"/>
+              <a:t>: </a:t>
+            </a:r>
+            <a:r>
+              <a:rPr lang="en-US" altLang="ja-JP" sz="1200" smtClean="0"/>
+              <a:t>3px</a:t>
+            </a:r>
+            <a:r>
+              <a:rPr lang="en-US" altLang="ja-JP" sz="1200" dirty="0" smtClean="0"/>
+              <a:t>, </a:t>
             </a:r>
           </a:p>
           <a:p>
@@ -4353,8 +4430,8 @@
           <p:nvPr/>
         </p:nvCxnSpPr>
         <p:spPr>
-          <a:xfrm flipH="1" flipV="1">
-            <a:off x="8286645" y="4021821"/>
+          <a:xfrm flipV="1">
+            <a:off x="2034415" y="4021759"/>
             <a:ext cx="335284" cy="3783"/>
           </a:xfrm>
           <a:prstGeom prst="straightConnector1">
@@ -4390,7 +4467,7 @@
         </p:nvSpPr>
         <p:spPr>
           <a:xfrm>
-            <a:off x="8569634" y="3872752"/>
+            <a:off x="1610501" y="3904228"/>
             <a:ext cx="407611" cy="276999"/>
           </a:xfrm>
           <a:prstGeom prst="rect">
@@ -4569,7 +4646,7 @@
         </p:nvSpPr>
         <p:spPr>
           <a:xfrm>
-            <a:off x="6396678" y="58054"/>
+            <a:off x="5517472" y="4325264"/>
             <a:ext cx="2593635" cy="646331"/>
           </a:xfrm>
           <a:prstGeom prst="rect">
@@ -4667,8 +4744,8 @@
         </p:nvCxnSpPr>
         <p:spPr>
           <a:xfrm flipH="1">
-            <a:off x="2379306" y="567136"/>
-            <a:ext cx="902258" cy="1056391"/>
+            <a:off x="2415867" y="676173"/>
+            <a:ext cx="33500" cy="964865"/>
           </a:xfrm>
           <a:prstGeom prst="straightConnector1">
             <a:avLst/>
@@ -4743,6 +4820,99 @@
               <a:t>を切り上げた整数</a:t>
             </a:r>
             <a:endParaRPr kumimoji="1" lang="ja-JP" altLang="en-US" sz="1200" dirty="0"/>
+          </a:p>
+        </p:txBody>
+      </p:sp>
+      <p:sp>
+        <p:nvSpPr>
+          <p:cNvPr id="40" name="テキスト ボックス 39"/>
+          <p:cNvSpPr txBox="1"/>
+          <p:nvPr/>
+        </p:nvSpPr>
+        <p:spPr>
+          <a:xfrm>
+            <a:off x="8445092" y="3904228"/>
+            <a:ext cx="1795428" cy="461665"/>
+          </a:xfrm>
+          <a:prstGeom prst="rect">
+            <a:avLst/>
+          </a:prstGeom>
+          <a:noFill/>
+        </p:spPr>
+        <p:txBody>
+          <a:bodyPr wrap="none" rtlCol="0">
+            <a:spAutoFit/>
+          </a:bodyPr>
+          <a:lstStyle/>
+          <a:p>
+            <a:pPr algn="ctr"/>
+            <a:r>
+              <a:rPr kumimoji="1" lang="en-US" altLang="ja-JP" sz="1200" dirty="0" smtClean="0"/>
+              <a:t>id</a:t>
+            </a:r>
+            <a:r>
+              <a:rPr kumimoji="1" lang="en-US" altLang="ja-JP" sz="1200" dirty="0" smtClean="0"/>
+              <a:t>=“</a:t>
+            </a:r>
+            <a:r>
+              <a:rPr kumimoji="1" lang="en-US" altLang="ja-JP" sz="1200" dirty="0" err="1" smtClean="0"/>
+              <a:t>div_panel</a:t>
+            </a:r>
+            <a:r>
+              <a:rPr kumimoji="1" lang="en-US" altLang="ja-JP" sz="1200" dirty="0" smtClean="0"/>
+              <a:t>”</a:t>
+            </a:r>
+          </a:p>
+          <a:p>
+            <a:pPr algn="ctr"/>
+            <a:r>
+              <a:rPr lang="en-US" altLang="ja-JP" sz="1200" dirty="0" smtClean="0"/>
+              <a:t>margin: 0px, padding: 5px</a:t>
+            </a:r>
+            <a:endParaRPr lang="ja-JP" altLang="en-US" sz="1200" dirty="0"/>
+          </a:p>
+        </p:txBody>
+      </p:sp>
+      <p:sp>
+        <p:nvSpPr>
+          <p:cNvPr id="41" name="左中かっこ 40"/>
+          <p:cNvSpPr/>
+          <p:nvPr/>
+        </p:nvSpPr>
+        <p:spPr>
+          <a:xfrm rot="10800000">
+            <a:off x="8466478" y="1502539"/>
+            <a:ext cx="252437" cy="5080378"/>
+          </a:xfrm>
+          <a:prstGeom prst="leftBrace">
+            <a:avLst/>
+          </a:prstGeom>
+          <a:ln w="19050">
+            <a:solidFill>
+              <a:srgbClr val="FFC000"/>
+            </a:solidFill>
+          </a:ln>
+        </p:spPr>
+        <p:style>
+          <a:lnRef idx="1">
+            <a:schemeClr val="accent1"/>
+          </a:lnRef>
+          <a:fillRef idx="0">
+            <a:schemeClr val="accent1"/>
+          </a:fillRef>
+          <a:effectRef idx="0">
+            <a:schemeClr val="accent1"/>
+          </a:effectRef>
+          <a:fontRef idx="minor">
+            <a:schemeClr val="tx1"/>
+          </a:fontRef>
+        </p:style>
+        <p:txBody>
+          <a:bodyPr rtlCol="0" anchor="ctr"/>
+          <a:lstStyle/>
+          <a:p>
+            <a:pPr algn="ctr"/>
+            <a:endParaRPr kumimoji="1" lang="ja-JP" altLang="en-US"/>
           </a:p>
         </p:txBody>
       </p:sp>

</xml_diff>